<commit_message>
Add: add page when lose
</commit_message>
<xml_diff>
--- a/OOAD-大作业-嗷大猫爱吃鱼游戏-黄绮.pptx
+++ b/OOAD-大作业-嗷大猫爱吃鱼游戏-黄绮.pptx
@@ -5,7 +5,7 @@
     <p:sldMasterId id="2147483650" r:id="rId1"/>
   </p:sldMasterIdLst>
   <p:notesMasterIdLst>
-    <p:notesMasterId r:id="rId24"/>
+    <p:notesMasterId r:id="rId27"/>
   </p:notesMasterIdLst>
   <p:sldIdLst>
     <p:sldId id="260" r:id="rId2"/>
@@ -28,13 +28,16 @@
     <p:sldId id="299" r:id="rId19"/>
     <p:sldId id="300" r:id="rId20"/>
     <p:sldId id="301" r:id="rId21"/>
-    <p:sldId id="289" r:id="rId22"/>
-    <p:sldId id="285" r:id="rId23"/>
+    <p:sldId id="304" r:id="rId22"/>
+    <p:sldId id="302" r:id="rId23"/>
+    <p:sldId id="303" r:id="rId24"/>
+    <p:sldId id="289" r:id="rId25"/>
+    <p:sldId id="285" r:id="rId26"/>
   </p:sldIdLst>
   <p:sldSz cx="12192000" cy="6858000"/>
   <p:notesSz cx="6858000" cy="9144000"/>
   <p:custDataLst>
-    <p:tags r:id="rId25"/>
+    <p:tags r:id="rId28"/>
   </p:custDataLst>
   <p:defaultTextStyle>
     <a:defPPr>
@@ -221,7 +224,7 @@
           <a:p>
             <a:fld id="{5D13BBE5-0BEA-4494-9BEF-C8C2F48C9E2D}" type="datetimeFigureOut">
               <a:rPr lang="zh-CN" altLang="en-US" smtClean="0"/>
-              <a:t>2019/1/12</a:t>
+              <a:t>2019/1/17</a:t>
             </a:fld>
             <a:endParaRPr lang="zh-CN" altLang="en-US"/>
           </a:p>
@@ -1655,7 +1658,7 @@
     </p:spTree>
     <p:extLst>
       <p:ext uri="{BB962C8B-B14F-4D97-AF65-F5344CB8AC3E}">
-        <p14:creationId xmlns:p14="http://schemas.microsoft.com/office/powerpoint/2010/main" val="461006990"/>
+        <p14:creationId xmlns:p14="http://schemas.microsoft.com/office/powerpoint/2010/main" val="1871948280"/>
       </p:ext>
     </p:extLst>
   </p:cSld>
@@ -1731,6 +1734,258 @@
             <a:fld id="{F1CB8912-F0BA-4AD8-8415-DA1F26BCB09F}" type="slidenum">
               <a:rPr lang="zh-CN" altLang="en-US" smtClean="0"/>
               <a:t>22</a:t>
+            </a:fld>
+            <a:endParaRPr lang="zh-CN" altLang="en-US"/>
+          </a:p>
+        </p:txBody>
+      </p:sp>
+    </p:spTree>
+    <p:extLst>
+      <p:ext uri="{BB962C8B-B14F-4D97-AF65-F5344CB8AC3E}">
+        <p14:creationId xmlns:p14="http://schemas.microsoft.com/office/powerpoint/2010/main" val="1274155763"/>
+      </p:ext>
+    </p:extLst>
+  </p:cSld>
+  <p:clrMapOvr>
+    <a:masterClrMapping/>
+  </p:clrMapOvr>
+</p:notes>
+</file>
+
+<file path=ppt/notesSlides/notesSlide23.xml><?xml version="1.0" encoding="utf-8"?>
+<p:notes xmlns:a="http://schemas.openxmlformats.org/drawingml/2006/main" xmlns:r="http://schemas.openxmlformats.org/officeDocument/2006/relationships" xmlns:p="http://schemas.openxmlformats.org/presentationml/2006/main">
+  <p:cSld>
+    <p:spTree>
+      <p:nvGrpSpPr>
+        <p:cNvPr id="1" name=""/>
+        <p:cNvGrpSpPr/>
+        <p:nvPr/>
+      </p:nvGrpSpPr>
+      <p:grpSpPr>
+        <a:xfrm>
+          <a:off x="0" y="0"/>
+          <a:ext cx="0" cy="0"/>
+          <a:chOff x="0" y="0"/>
+          <a:chExt cx="0" cy="0"/>
+        </a:xfrm>
+      </p:grpSpPr>
+      <p:sp>
+        <p:nvSpPr>
+          <p:cNvPr id="2" name="幻灯片图像占位符 1"/>
+          <p:cNvSpPr>
+            <a:spLocks noGrp="1" noRot="1" noChangeAspect="1"/>
+          </p:cNvSpPr>
+          <p:nvPr>
+            <p:ph type="sldImg"/>
+          </p:nvPr>
+        </p:nvSpPr>
+        <p:spPr/>
+      </p:sp>
+      <p:sp>
+        <p:nvSpPr>
+          <p:cNvPr id="3" name="备注占位符 2"/>
+          <p:cNvSpPr>
+            <a:spLocks noGrp="1"/>
+          </p:cNvSpPr>
+          <p:nvPr>
+            <p:ph type="body" idx="1"/>
+          </p:nvPr>
+        </p:nvSpPr>
+        <p:spPr/>
+        <p:txBody>
+          <a:bodyPr/>
+          <a:lstStyle/>
+          <a:p>
+            <a:endParaRPr lang="zh-CN" altLang="en-US"/>
+          </a:p>
+        </p:txBody>
+      </p:sp>
+      <p:sp>
+        <p:nvSpPr>
+          <p:cNvPr id="4" name="灯片编号占位符 3"/>
+          <p:cNvSpPr>
+            <a:spLocks noGrp="1"/>
+          </p:cNvSpPr>
+          <p:nvPr>
+            <p:ph type="sldNum" sz="quarter" idx="10"/>
+          </p:nvPr>
+        </p:nvSpPr>
+        <p:spPr/>
+        <p:txBody>
+          <a:bodyPr/>
+          <a:lstStyle/>
+          <a:p>
+            <a:fld id="{F1CB8912-F0BA-4AD8-8415-DA1F26BCB09F}" type="slidenum">
+              <a:rPr lang="zh-CN" altLang="en-US" smtClean="0"/>
+              <a:t>23</a:t>
+            </a:fld>
+            <a:endParaRPr lang="zh-CN" altLang="en-US"/>
+          </a:p>
+        </p:txBody>
+      </p:sp>
+    </p:spTree>
+    <p:extLst>
+      <p:ext uri="{BB962C8B-B14F-4D97-AF65-F5344CB8AC3E}">
+        <p14:creationId xmlns:p14="http://schemas.microsoft.com/office/powerpoint/2010/main" val="1854396088"/>
+      </p:ext>
+    </p:extLst>
+  </p:cSld>
+  <p:clrMapOvr>
+    <a:masterClrMapping/>
+  </p:clrMapOvr>
+</p:notes>
+</file>
+
+<file path=ppt/notesSlides/notesSlide24.xml><?xml version="1.0" encoding="utf-8"?>
+<p:notes xmlns:a="http://schemas.openxmlformats.org/drawingml/2006/main" xmlns:r="http://schemas.openxmlformats.org/officeDocument/2006/relationships" xmlns:p="http://schemas.openxmlformats.org/presentationml/2006/main">
+  <p:cSld>
+    <p:spTree>
+      <p:nvGrpSpPr>
+        <p:cNvPr id="1" name=""/>
+        <p:cNvGrpSpPr/>
+        <p:nvPr/>
+      </p:nvGrpSpPr>
+      <p:grpSpPr>
+        <a:xfrm>
+          <a:off x="0" y="0"/>
+          <a:ext cx="0" cy="0"/>
+          <a:chOff x="0" y="0"/>
+          <a:chExt cx="0" cy="0"/>
+        </a:xfrm>
+      </p:grpSpPr>
+      <p:sp>
+        <p:nvSpPr>
+          <p:cNvPr id="2" name="幻灯片图像占位符 1"/>
+          <p:cNvSpPr>
+            <a:spLocks noGrp="1" noRot="1" noChangeAspect="1"/>
+          </p:cNvSpPr>
+          <p:nvPr>
+            <p:ph type="sldImg"/>
+          </p:nvPr>
+        </p:nvSpPr>
+        <p:spPr/>
+      </p:sp>
+      <p:sp>
+        <p:nvSpPr>
+          <p:cNvPr id="3" name="备注占位符 2"/>
+          <p:cNvSpPr>
+            <a:spLocks noGrp="1"/>
+          </p:cNvSpPr>
+          <p:nvPr>
+            <p:ph type="body" idx="1"/>
+          </p:nvPr>
+        </p:nvSpPr>
+        <p:spPr/>
+        <p:txBody>
+          <a:bodyPr/>
+          <a:lstStyle/>
+          <a:p>
+            <a:endParaRPr lang="zh-CN" altLang="en-US"/>
+          </a:p>
+        </p:txBody>
+      </p:sp>
+      <p:sp>
+        <p:nvSpPr>
+          <p:cNvPr id="4" name="灯片编号占位符 3"/>
+          <p:cNvSpPr>
+            <a:spLocks noGrp="1"/>
+          </p:cNvSpPr>
+          <p:nvPr>
+            <p:ph type="sldNum" sz="quarter" idx="10"/>
+          </p:nvPr>
+        </p:nvSpPr>
+        <p:spPr/>
+        <p:txBody>
+          <a:bodyPr/>
+          <a:lstStyle/>
+          <a:p>
+            <a:fld id="{F1CB8912-F0BA-4AD8-8415-DA1F26BCB09F}" type="slidenum">
+              <a:rPr lang="zh-CN" altLang="en-US" smtClean="0"/>
+              <a:t>24</a:t>
+            </a:fld>
+            <a:endParaRPr lang="zh-CN" altLang="en-US"/>
+          </a:p>
+        </p:txBody>
+      </p:sp>
+    </p:spTree>
+    <p:extLst>
+      <p:ext uri="{BB962C8B-B14F-4D97-AF65-F5344CB8AC3E}">
+        <p14:creationId xmlns:p14="http://schemas.microsoft.com/office/powerpoint/2010/main" val="461006990"/>
+      </p:ext>
+    </p:extLst>
+  </p:cSld>
+  <p:clrMapOvr>
+    <a:masterClrMapping/>
+  </p:clrMapOvr>
+</p:notes>
+</file>
+
+<file path=ppt/notesSlides/notesSlide25.xml><?xml version="1.0" encoding="utf-8"?>
+<p:notes xmlns:a="http://schemas.openxmlformats.org/drawingml/2006/main" xmlns:r="http://schemas.openxmlformats.org/officeDocument/2006/relationships" xmlns:p="http://schemas.openxmlformats.org/presentationml/2006/main">
+  <p:cSld>
+    <p:spTree>
+      <p:nvGrpSpPr>
+        <p:cNvPr id="1" name=""/>
+        <p:cNvGrpSpPr/>
+        <p:nvPr/>
+      </p:nvGrpSpPr>
+      <p:grpSpPr>
+        <a:xfrm>
+          <a:off x="0" y="0"/>
+          <a:ext cx="0" cy="0"/>
+          <a:chOff x="0" y="0"/>
+          <a:chExt cx="0" cy="0"/>
+        </a:xfrm>
+      </p:grpSpPr>
+      <p:sp>
+        <p:nvSpPr>
+          <p:cNvPr id="2" name="幻灯片图像占位符 1"/>
+          <p:cNvSpPr>
+            <a:spLocks noGrp="1" noRot="1" noChangeAspect="1"/>
+          </p:cNvSpPr>
+          <p:nvPr>
+            <p:ph type="sldImg"/>
+          </p:nvPr>
+        </p:nvSpPr>
+        <p:spPr/>
+      </p:sp>
+      <p:sp>
+        <p:nvSpPr>
+          <p:cNvPr id="3" name="备注占位符 2"/>
+          <p:cNvSpPr>
+            <a:spLocks noGrp="1"/>
+          </p:cNvSpPr>
+          <p:nvPr>
+            <p:ph type="body" idx="1"/>
+          </p:nvPr>
+        </p:nvSpPr>
+        <p:spPr/>
+        <p:txBody>
+          <a:bodyPr/>
+          <a:lstStyle/>
+          <a:p>
+            <a:endParaRPr lang="zh-CN" altLang="en-US"/>
+          </a:p>
+        </p:txBody>
+      </p:sp>
+      <p:sp>
+        <p:nvSpPr>
+          <p:cNvPr id="4" name="灯片编号占位符 3"/>
+          <p:cNvSpPr>
+            <a:spLocks noGrp="1"/>
+          </p:cNvSpPr>
+          <p:nvPr>
+            <p:ph type="sldNum" sz="quarter" idx="10"/>
+          </p:nvPr>
+        </p:nvSpPr>
+        <p:spPr/>
+        <p:txBody>
+          <a:bodyPr/>
+          <a:lstStyle/>
+          <a:p>
+            <a:fld id="{F1CB8912-F0BA-4AD8-8415-DA1F26BCB09F}" type="slidenum">
+              <a:rPr lang="zh-CN" altLang="en-US" smtClean="0"/>
+              <a:t>25</a:t>
             </a:fld>
             <a:endParaRPr lang="zh-CN" altLang="en-US"/>
           </a:p>
@@ -10526,7 +10781,7 @@
       </p:sp>
       <p:pic>
         <p:nvPicPr>
-          <p:cNvPr id="5" name="Picture 4"/>
+          <p:cNvPr id="3" name="Picture 2"/>
           <p:cNvPicPr>
             <a:picLocks noChangeAspect="1"/>
           </p:cNvPicPr>
@@ -10540,8 +10795,8 @@
         </p:blipFill>
         <p:spPr>
           <a:xfrm>
-            <a:off x="5600700" y="1024506"/>
-            <a:ext cx="5178954" cy="4505690"/>
+            <a:off x="5626100" y="1097086"/>
+            <a:ext cx="5537200" cy="4817364"/>
           </a:xfrm>
           <a:prstGeom prst="rect">
             <a:avLst/>
@@ -11239,7 +11494,7 @@
       </p:sp>
       <p:pic>
         <p:nvPicPr>
-          <p:cNvPr id="20" name="Picture 19"/>
+          <p:cNvPr id="3" name="Picture 2"/>
           <p:cNvPicPr>
             <a:picLocks noChangeAspect="1"/>
           </p:cNvPicPr>
@@ -11253,8 +11508,8 @@
         </p:blipFill>
         <p:spPr>
           <a:xfrm>
-            <a:off x="5816600" y="741329"/>
-            <a:ext cx="5511800" cy="4795266"/>
+            <a:off x="5524499" y="741329"/>
+            <a:ext cx="5781671" cy="5030054"/>
           </a:xfrm>
           <a:prstGeom prst="rect">
             <a:avLst/>
@@ -11872,7 +12127,7 @@
       </p:sp>
       <p:pic>
         <p:nvPicPr>
-          <p:cNvPr id="3" name="Picture 2"/>
+          <p:cNvPr id="5" name="Picture 4"/>
           <p:cNvPicPr>
             <a:picLocks noChangeAspect="1"/>
           </p:cNvPicPr>
@@ -11886,8 +12141,8 @@
         </p:blipFill>
         <p:spPr>
           <a:xfrm>
-            <a:off x="538490" y="1905727"/>
-            <a:ext cx="4715057" cy="4102100"/>
+            <a:off x="791001" y="1959565"/>
+            <a:ext cx="4514322" cy="3927460"/>
           </a:xfrm>
           <a:prstGeom prst="rect">
             <a:avLst/>
@@ -11896,7 +12151,7 @@
       </p:pic>
       <p:pic>
         <p:nvPicPr>
-          <p:cNvPr id="4" name="Picture 3"/>
+          <p:cNvPr id="6" name="Picture 5"/>
           <p:cNvPicPr>
             <a:picLocks noChangeAspect="1"/>
           </p:cNvPicPr>
@@ -11910,8 +12165,8 @@
         </p:blipFill>
         <p:spPr>
           <a:xfrm>
-            <a:off x="6372812" y="1905727"/>
-            <a:ext cx="4638088" cy="4035137"/>
+            <a:off x="6308721" y="1922713"/>
+            <a:ext cx="4562479" cy="3969357"/>
           </a:xfrm>
           <a:prstGeom prst="rect">
             <a:avLst/>
@@ -13327,7 +13582,7 @@
       </p:sp>
       <p:pic>
         <p:nvPicPr>
-          <p:cNvPr id="3" name="Picture 2"/>
+          <p:cNvPr id="5" name="Picture 4"/>
           <p:cNvPicPr>
             <a:picLocks noChangeAspect="1"/>
           </p:cNvPicPr>
@@ -13341,8 +13596,8 @@
         </p:blipFill>
         <p:spPr>
           <a:xfrm>
-            <a:off x="5014316" y="1244006"/>
-            <a:ext cx="5577443" cy="4852375"/>
+            <a:off x="4991100" y="964310"/>
+            <a:ext cx="5854700" cy="5093589"/>
           </a:xfrm>
           <a:prstGeom prst="rect">
             <a:avLst/>
@@ -13522,6 +13777,52 @@
             </p:txBody>
           </p:sp>
         </p:grpSp>
+        <p:sp>
+          <p:nvSpPr>
+            <p:cNvPr id="184" name="文本框 183"/>
+            <p:cNvSpPr txBox="1"/>
+            <p:nvPr/>
+          </p:nvSpPr>
+          <p:spPr>
+            <a:xfrm>
+              <a:off x="900242" y="428399"/>
+              <a:ext cx="722818" cy="584775"/>
+            </a:xfrm>
+            <a:prstGeom prst="rect">
+              <a:avLst/>
+            </a:prstGeom>
+            <a:noFill/>
+          </p:spPr>
+          <p:txBody>
+            <a:bodyPr wrap="square" rtlCol="0">
+              <a:spAutoFit/>
+              <a:scene3d>
+                <a:camera prst="orthographicFront"/>
+                <a:lightRig rig="threePt" dir="t"/>
+              </a:scene3d>
+              <a:sp3d contourW="12700"/>
+            </a:bodyPr>
+            <a:lstStyle/>
+            <a:p>
+              <a:pPr algn="ctr"/>
+              <a:r>
+                <a:rPr lang="en-US" altLang="zh-CN" sz="3200" dirty="0" smtClean="0">
+                  <a:solidFill>
+                    <a:schemeClr val="accent1"/>
+                  </a:solidFill>
+                  <a:latin typeface="Agency FB" panose="020B0503020202020204" pitchFamily="34" charset="0"/>
+                </a:rPr>
+                <a:t>04</a:t>
+              </a:r>
+              <a:endParaRPr lang="zh-CN" altLang="en-US" sz="3200" dirty="0">
+                <a:solidFill>
+                  <a:schemeClr val="accent1"/>
+                </a:solidFill>
+                <a:latin typeface="Agency FB" panose="020B0503020202020204" pitchFamily="34" charset="0"/>
+              </a:endParaRPr>
+            </a:p>
+          </p:txBody>
+        </p:sp>
         <p:grpSp>
           <p:nvGrpSpPr>
             <p:cNvPr id="186" name="组合 185"/>
@@ -13662,6 +13963,1905 @@
       </p:sp>
       <p:sp>
         <p:nvSpPr>
+          <p:cNvPr id="52" name="文本框 51"/>
+          <p:cNvSpPr txBox="1"/>
+          <p:nvPr/>
+        </p:nvSpPr>
+        <p:spPr>
+          <a:xfrm>
+            <a:off x="1874962" y="459176"/>
+            <a:ext cx="4198105" cy="523220"/>
+          </a:xfrm>
+          <a:prstGeom prst="rect">
+            <a:avLst/>
+          </a:prstGeom>
+          <a:noFill/>
+        </p:spPr>
+        <p:txBody>
+          <a:bodyPr wrap="square" rtlCol="0">
+            <a:spAutoFit/>
+            <a:scene3d>
+              <a:camera prst="orthographicFront"/>
+              <a:lightRig rig="threePt" dir="t"/>
+            </a:scene3d>
+            <a:sp3d contourW="12700"/>
+          </a:bodyPr>
+          <a:lstStyle/>
+          <a:p>
+            <a:r>
+              <a:rPr lang="zh-CN" altLang="en-US" sz="2800" b="1" dirty="0" smtClean="0">
+                <a:solidFill>
+                  <a:schemeClr val="tx1">
+                    <a:lumMod val="75000"/>
+                    <a:lumOff val="25000"/>
+                  </a:schemeClr>
+                </a:solidFill>
+                <a:latin typeface="Century Gothic" panose="020B0502020202020204" pitchFamily="34" charset="0"/>
+              </a:rPr>
+              <a:t>系统实现</a:t>
+            </a:r>
+            <a:endParaRPr lang="en-US" altLang="zh-CN" sz="2800" b="1" dirty="0" smtClean="0">
+              <a:solidFill>
+                <a:schemeClr val="tx1">
+                  <a:lumMod val="75000"/>
+                  <a:lumOff val="25000"/>
+                </a:schemeClr>
+              </a:solidFill>
+              <a:latin typeface="Century Gothic" panose="020B0502020202020204" pitchFamily="34" charset="0"/>
+            </a:endParaRPr>
+          </a:p>
+        </p:txBody>
+      </p:sp>
+      <p:sp>
+        <p:nvSpPr>
+          <p:cNvPr id="13" name="文本框 51"/>
+          <p:cNvSpPr txBox="1"/>
+          <p:nvPr/>
+        </p:nvSpPr>
+        <p:spPr>
+          <a:xfrm>
+            <a:off x="1977266" y="1013174"/>
+            <a:ext cx="4198105" cy="461665"/>
+          </a:xfrm>
+          <a:prstGeom prst="rect">
+            <a:avLst/>
+          </a:prstGeom>
+          <a:noFill/>
+        </p:spPr>
+        <p:txBody>
+          <a:bodyPr wrap="square" rtlCol="0">
+            <a:spAutoFit/>
+            <a:scene3d>
+              <a:camera prst="orthographicFront"/>
+              <a:lightRig rig="threePt" dir="t"/>
+            </a:scene3d>
+            <a:sp3d contourW="12700"/>
+          </a:bodyPr>
+          <a:lstStyle/>
+          <a:p>
+            <a:r>
+              <a:rPr lang="en-US" altLang="zh-CN" sz="2400" b="1" dirty="0">
+                <a:solidFill>
+                  <a:schemeClr val="tx1">
+                    <a:lumMod val="75000"/>
+                    <a:lumOff val="25000"/>
+                  </a:schemeClr>
+                </a:solidFill>
+                <a:latin typeface="Century Gothic" panose="020B0502020202020204" pitchFamily="34" charset="0"/>
+              </a:rPr>
+              <a:t>4.4</a:t>
+            </a:r>
+            <a:r>
+              <a:rPr lang="zh-CN" altLang="en-US" sz="2400" b="1" dirty="0">
+                <a:solidFill>
+                  <a:schemeClr val="tx1">
+                    <a:lumMod val="75000"/>
+                    <a:lumOff val="25000"/>
+                  </a:schemeClr>
+                </a:solidFill>
+                <a:latin typeface="Century Gothic" panose="020B0502020202020204" pitchFamily="34" charset="0"/>
+              </a:rPr>
+              <a:t> 运行效果</a:t>
+            </a:r>
+            <a:endParaRPr lang="en-US" altLang="zh-CN" sz="2400" b="1" dirty="0">
+              <a:solidFill>
+                <a:schemeClr val="tx1">
+                  <a:lumMod val="75000"/>
+                  <a:lumOff val="25000"/>
+                </a:schemeClr>
+              </a:solidFill>
+              <a:latin typeface="Century Gothic" panose="020B0502020202020204" pitchFamily="34" charset="0"/>
+            </a:endParaRPr>
+          </a:p>
+        </p:txBody>
+      </p:sp>
+      <p:sp>
+        <p:nvSpPr>
+          <p:cNvPr id="17" name="文本框 51"/>
+          <p:cNvSpPr txBox="1"/>
+          <p:nvPr/>
+        </p:nvSpPr>
+        <p:spPr>
+          <a:xfrm>
+            <a:off x="2428707" y="1505617"/>
+            <a:ext cx="4198105" cy="400110"/>
+          </a:xfrm>
+          <a:prstGeom prst="rect">
+            <a:avLst/>
+          </a:prstGeom>
+          <a:noFill/>
+        </p:spPr>
+        <p:txBody>
+          <a:bodyPr wrap="square" rtlCol="0">
+            <a:spAutoFit/>
+            <a:scene3d>
+              <a:camera prst="orthographicFront"/>
+              <a:lightRig rig="threePt" dir="t"/>
+            </a:scene3d>
+            <a:sp3d contourW="12700"/>
+          </a:bodyPr>
+          <a:lstStyle/>
+          <a:p>
+            <a:r>
+              <a:rPr lang="en-US" altLang="zh-CN" sz="2000" b="1" dirty="0" smtClean="0">
+                <a:solidFill>
+                  <a:schemeClr val="tx1">
+                    <a:lumMod val="75000"/>
+                    <a:lumOff val="25000"/>
+                  </a:schemeClr>
+                </a:solidFill>
+                <a:latin typeface="Century Gothic" panose="020B0502020202020204" pitchFamily="34" charset="0"/>
+              </a:rPr>
+              <a:t>4.4.2</a:t>
+            </a:r>
+            <a:r>
+              <a:rPr lang="zh-CN" altLang="en-US" sz="2000" b="1" dirty="0" smtClean="0">
+                <a:solidFill>
+                  <a:schemeClr val="tx1">
+                    <a:lumMod val="75000"/>
+                    <a:lumOff val="25000"/>
+                  </a:schemeClr>
+                </a:solidFill>
+                <a:latin typeface="Century Gothic" panose="020B0502020202020204" pitchFamily="34" charset="0"/>
+              </a:rPr>
+              <a:t> 游戏开始</a:t>
+            </a:r>
+            <a:endParaRPr lang="en-US" altLang="zh-CN" sz="2000" b="1" dirty="0" smtClean="0">
+              <a:solidFill>
+                <a:schemeClr val="tx1">
+                  <a:lumMod val="75000"/>
+                  <a:lumOff val="25000"/>
+                </a:schemeClr>
+              </a:solidFill>
+              <a:latin typeface="Century Gothic" panose="020B0502020202020204" pitchFamily="34" charset="0"/>
+            </a:endParaRPr>
+          </a:p>
+        </p:txBody>
+      </p:sp>
+      <p:sp>
+        <p:nvSpPr>
+          <p:cNvPr id="19" name="文本框 51"/>
+          <p:cNvSpPr txBox="1"/>
+          <p:nvPr/>
+        </p:nvSpPr>
+        <p:spPr>
+          <a:xfrm>
+            <a:off x="658969" y="2396449"/>
+            <a:ext cx="3824131" cy="646331"/>
+          </a:xfrm>
+          <a:prstGeom prst="rect">
+            <a:avLst/>
+          </a:prstGeom>
+          <a:noFill/>
+        </p:spPr>
+        <p:txBody>
+          <a:bodyPr wrap="square" rtlCol="0">
+            <a:spAutoFit/>
+            <a:scene3d>
+              <a:camera prst="orthographicFront"/>
+              <a:lightRig rig="threePt" dir="t"/>
+            </a:scene3d>
+            <a:sp3d contourW="12700"/>
+          </a:bodyPr>
+          <a:lstStyle/>
+          <a:p>
+            <a:r>
+              <a:rPr lang="zh-CN" altLang="en-US" dirty="0" smtClean="0">
+                <a:solidFill>
+                  <a:schemeClr val="tx1">
+                    <a:lumMod val="75000"/>
+                    <a:lumOff val="25000"/>
+                  </a:schemeClr>
+                </a:solidFill>
+                <a:latin typeface="Century Gothic" panose="020B0502020202020204" pitchFamily="34" charset="0"/>
+              </a:rPr>
+              <a:t>当生命值小于分</a:t>
+            </a:r>
+            <a:r>
+              <a:rPr lang="en-US" altLang="zh-CN" dirty="0" smtClean="0">
+                <a:solidFill>
+                  <a:schemeClr val="tx1">
+                    <a:lumMod val="75000"/>
+                    <a:lumOff val="25000"/>
+                  </a:schemeClr>
+                </a:solidFill>
+                <a:latin typeface="Century Gothic" panose="020B0502020202020204" pitchFamily="34" charset="0"/>
+              </a:rPr>
+              <a:t>8</a:t>
+            </a:r>
+            <a:r>
+              <a:rPr lang="zh-CN" altLang="en-US" dirty="0" smtClean="0">
+                <a:solidFill>
+                  <a:schemeClr val="tx1">
+                    <a:lumMod val="75000"/>
+                    <a:lumOff val="25000"/>
+                  </a:schemeClr>
+                </a:solidFill>
+                <a:latin typeface="Century Gothic" panose="020B0502020202020204" pitchFamily="34" charset="0"/>
+              </a:rPr>
+              <a:t>时，随机出现爱心，接住就能加一个生命值</a:t>
+            </a:r>
+            <a:endParaRPr lang="en-US" altLang="zh-CN" dirty="0" smtClean="0">
+              <a:solidFill>
+                <a:schemeClr val="tx1">
+                  <a:lumMod val="75000"/>
+                  <a:lumOff val="25000"/>
+                </a:schemeClr>
+              </a:solidFill>
+              <a:latin typeface="Century Gothic" panose="020B0502020202020204" pitchFamily="34" charset="0"/>
+            </a:endParaRPr>
+          </a:p>
+        </p:txBody>
+      </p:sp>
+      <p:pic>
+        <p:nvPicPr>
+          <p:cNvPr id="3" name="Picture 2"/>
+          <p:cNvPicPr>
+            <a:picLocks noChangeAspect="1"/>
+          </p:cNvPicPr>
+          <p:nvPr/>
+        </p:nvPicPr>
+        <p:blipFill>
+          <a:blip r:embed="rId3"/>
+          <a:stretch>
+            <a:fillRect/>
+          </a:stretch>
+        </p:blipFill>
+        <p:spPr>
+          <a:xfrm>
+            <a:off x="4915653" y="741329"/>
+            <a:ext cx="5525511" cy="4807195"/>
+          </a:xfrm>
+          <a:prstGeom prst="rect">
+            <a:avLst/>
+          </a:prstGeom>
+        </p:spPr>
+      </p:pic>
+    </p:spTree>
+    <p:extLst>
+      <p:ext uri="{BB962C8B-B14F-4D97-AF65-F5344CB8AC3E}">
+        <p14:creationId xmlns:p14="http://schemas.microsoft.com/office/powerpoint/2010/main" val="857980434"/>
+      </p:ext>
+    </p:extLst>
+  </p:cSld>
+  <p:clrMapOvr>
+    <a:masterClrMapping/>
+  </p:clrMapOvr>
+  <mc:AlternateContent xmlns:mc="http://schemas.openxmlformats.org/markup-compatibility/2006" xmlns:p14="http://schemas.microsoft.com/office/powerpoint/2010/main">
+    <mc:Choice Requires="p14">
+      <p:transition spd="slow" p14:dur="1500">
+        <p:random/>
+      </p:transition>
+    </mc:Choice>
+    <mc:Fallback xmlns="">
+      <p:transition spd="slow">
+        <p:random/>
+      </p:transition>
+    </mc:Fallback>
+  </mc:AlternateContent>
+  <p:timing>
+    <p:tnLst>
+      <p:par>
+        <p:cTn id="1" dur="indefinite" restart="never" nodeType="tmRoot"/>
+      </p:par>
+    </p:tnLst>
+  </p:timing>
+</p:sld>
+</file>
+
+<file path=ppt/slides/slide22.xml><?xml version="1.0" encoding="utf-8"?>
+<p:sld xmlns:a="http://schemas.openxmlformats.org/drawingml/2006/main" xmlns:r="http://schemas.openxmlformats.org/officeDocument/2006/relationships" xmlns:p="http://schemas.openxmlformats.org/presentationml/2006/main">
+  <p:cSld>
+    <p:spTree>
+      <p:nvGrpSpPr>
+        <p:cNvPr id="1" name=""/>
+        <p:cNvGrpSpPr/>
+        <p:nvPr/>
+      </p:nvGrpSpPr>
+      <p:grpSpPr>
+        <a:xfrm>
+          <a:off x="0" y="0"/>
+          <a:ext cx="0" cy="0"/>
+          <a:chOff x="0" y="0"/>
+          <a:chExt cx="0" cy="0"/>
+        </a:xfrm>
+      </p:grpSpPr>
+      <p:grpSp>
+        <p:nvGrpSpPr>
+          <p:cNvPr id="182" name="组合 181"/>
+          <p:cNvGrpSpPr/>
+          <p:nvPr/>
+        </p:nvGrpSpPr>
+        <p:grpSpPr>
+          <a:xfrm>
+            <a:off x="387125" y="299356"/>
+            <a:ext cx="12126303" cy="6596744"/>
+            <a:chOff x="387125" y="299356"/>
+            <a:chExt cx="12126303" cy="6596744"/>
+          </a:xfrm>
+        </p:grpSpPr>
+        <p:grpSp>
+          <p:nvGrpSpPr>
+            <p:cNvPr id="183" name="组合 182"/>
+            <p:cNvGrpSpPr/>
+            <p:nvPr/>
+          </p:nvGrpSpPr>
+          <p:grpSpPr>
+            <a:xfrm>
+              <a:off x="387125" y="299356"/>
+              <a:ext cx="1316500" cy="883947"/>
+              <a:chOff x="1276124" y="1279752"/>
+              <a:chExt cx="6401933" cy="4298496"/>
+            </a:xfrm>
+          </p:grpSpPr>
+          <p:sp>
+            <p:nvSpPr>
+              <p:cNvPr id="191" name="菱形 190"/>
+              <p:cNvSpPr/>
+              <p:nvPr/>
+            </p:nvSpPr>
+            <p:spPr>
+              <a:xfrm>
+                <a:off x="1276124" y="2107066"/>
+                <a:ext cx="2643868" cy="2643868"/>
+              </a:xfrm>
+              <a:prstGeom prst="diamond">
+                <a:avLst/>
+              </a:prstGeom>
+              <a:noFill/>
+              <a:ln w="28575">
+                <a:solidFill>
+                  <a:schemeClr val="accent1">
+                    <a:lumMod val="60000"/>
+                    <a:lumOff val="40000"/>
+                  </a:schemeClr>
+                </a:solidFill>
+              </a:ln>
+            </p:spPr>
+            <p:style>
+              <a:lnRef idx="2">
+                <a:schemeClr val="accent1">
+                  <a:shade val="50000"/>
+                </a:schemeClr>
+              </a:lnRef>
+              <a:fillRef idx="1">
+                <a:schemeClr val="accent1"/>
+              </a:fillRef>
+              <a:effectRef idx="0">
+                <a:schemeClr val="accent1"/>
+              </a:effectRef>
+              <a:fontRef idx="minor">
+                <a:schemeClr val="lt1"/>
+              </a:fontRef>
+            </p:style>
+            <p:txBody>
+              <a:bodyPr rtlCol="0" anchor="ctr"/>
+              <a:lstStyle/>
+              <a:p>
+                <a:pPr algn="ctr"/>
+                <a:endParaRPr lang="zh-CN" altLang="en-US"/>
+              </a:p>
+            </p:txBody>
+          </p:sp>
+          <p:sp>
+            <p:nvSpPr>
+              <p:cNvPr id="192" name="菱形 191"/>
+              <p:cNvSpPr/>
+              <p:nvPr/>
+            </p:nvSpPr>
+            <p:spPr>
+              <a:xfrm>
+                <a:off x="3379561" y="1279752"/>
+                <a:ext cx="4298496" cy="4298496"/>
+              </a:xfrm>
+              <a:prstGeom prst="diamond">
+                <a:avLst/>
+              </a:prstGeom>
+              <a:noFill/>
+              <a:ln w="28575">
+                <a:solidFill>
+                  <a:srgbClr val="A72020"/>
+                </a:solidFill>
+              </a:ln>
+            </p:spPr>
+            <p:style>
+              <a:lnRef idx="2">
+                <a:schemeClr val="accent1">
+                  <a:shade val="50000"/>
+                </a:schemeClr>
+              </a:lnRef>
+              <a:fillRef idx="1">
+                <a:schemeClr val="accent1"/>
+              </a:fillRef>
+              <a:effectRef idx="0">
+                <a:schemeClr val="accent1"/>
+              </a:effectRef>
+              <a:fontRef idx="minor">
+                <a:schemeClr val="lt1"/>
+              </a:fontRef>
+            </p:style>
+            <p:txBody>
+              <a:bodyPr rtlCol="0" anchor="ctr"/>
+              <a:lstStyle/>
+              <a:p>
+                <a:pPr algn="ctr"/>
+                <a:endParaRPr lang="zh-CN" altLang="en-US"/>
+              </a:p>
+            </p:txBody>
+          </p:sp>
+        </p:grpSp>
+        <p:sp>
+          <p:nvSpPr>
+            <p:cNvPr id="184" name="文本框 183"/>
+            <p:cNvSpPr txBox="1"/>
+            <p:nvPr/>
+          </p:nvSpPr>
+          <p:spPr>
+            <a:xfrm>
+              <a:off x="900242" y="428399"/>
+              <a:ext cx="722818" cy="584775"/>
+            </a:xfrm>
+            <a:prstGeom prst="rect">
+              <a:avLst/>
+            </a:prstGeom>
+            <a:noFill/>
+          </p:spPr>
+          <p:txBody>
+            <a:bodyPr wrap="square" rtlCol="0">
+              <a:spAutoFit/>
+              <a:scene3d>
+                <a:camera prst="orthographicFront"/>
+                <a:lightRig rig="threePt" dir="t"/>
+              </a:scene3d>
+              <a:sp3d contourW="12700"/>
+            </a:bodyPr>
+            <a:lstStyle/>
+            <a:p>
+              <a:pPr algn="ctr"/>
+              <a:r>
+                <a:rPr lang="en-US" altLang="zh-CN" sz="3200" dirty="0" smtClean="0">
+                  <a:solidFill>
+                    <a:schemeClr val="accent1"/>
+                  </a:solidFill>
+                  <a:latin typeface="Agency FB" panose="020B0503020202020204" pitchFamily="34" charset="0"/>
+                </a:rPr>
+                <a:t>04</a:t>
+              </a:r>
+              <a:endParaRPr lang="zh-CN" altLang="en-US" sz="3200" dirty="0">
+                <a:solidFill>
+                  <a:schemeClr val="accent1"/>
+                </a:solidFill>
+                <a:latin typeface="Agency FB" panose="020B0503020202020204" pitchFamily="34" charset="0"/>
+              </a:endParaRPr>
+            </a:p>
+          </p:txBody>
+        </p:sp>
+        <p:grpSp>
+          <p:nvGrpSpPr>
+            <p:cNvPr id="186" name="组合 185"/>
+            <p:cNvGrpSpPr/>
+            <p:nvPr/>
+          </p:nvGrpSpPr>
+          <p:grpSpPr>
+            <a:xfrm>
+              <a:off x="11572872" y="6254988"/>
+              <a:ext cx="940556" cy="641112"/>
+              <a:chOff x="11395287" y="6034159"/>
+              <a:chExt cx="1208633" cy="823841"/>
+            </a:xfrm>
+          </p:grpSpPr>
+          <p:sp>
+            <p:nvSpPr>
+              <p:cNvPr id="187" name="菱形 186"/>
+              <p:cNvSpPr/>
+              <p:nvPr/>
+            </p:nvSpPr>
+            <p:spPr>
+              <a:xfrm>
+                <a:off x="11780079" y="6034159"/>
+                <a:ext cx="823841" cy="823841"/>
+              </a:xfrm>
+              <a:prstGeom prst="diamond">
+                <a:avLst/>
+              </a:prstGeom>
+              <a:noFill/>
+              <a:ln w="28575">
+                <a:solidFill>
+                  <a:schemeClr val="accent1">
+                    <a:lumMod val="60000"/>
+                    <a:lumOff val="40000"/>
+                  </a:schemeClr>
+                </a:solidFill>
+              </a:ln>
+            </p:spPr>
+            <p:style>
+              <a:lnRef idx="2">
+                <a:schemeClr val="accent1">
+                  <a:shade val="50000"/>
+                </a:schemeClr>
+              </a:lnRef>
+              <a:fillRef idx="1">
+                <a:schemeClr val="accent1"/>
+              </a:fillRef>
+              <a:effectRef idx="0">
+                <a:schemeClr val="accent1"/>
+              </a:effectRef>
+              <a:fontRef idx="minor">
+                <a:schemeClr val="lt1"/>
+              </a:fontRef>
+            </p:style>
+            <p:txBody>
+              <a:bodyPr rtlCol="0" anchor="ctr"/>
+              <a:lstStyle/>
+              <a:p>
+                <a:pPr algn="ctr"/>
+                <a:endParaRPr lang="zh-CN" altLang="en-US"/>
+              </a:p>
+            </p:txBody>
+          </p:sp>
+          <p:sp>
+            <p:nvSpPr>
+              <p:cNvPr id="188" name="菱形 187"/>
+              <p:cNvSpPr/>
+              <p:nvPr/>
+            </p:nvSpPr>
+            <p:spPr>
+              <a:xfrm>
+                <a:off x="11395287" y="6157367"/>
+                <a:ext cx="577426" cy="577426"/>
+              </a:xfrm>
+              <a:prstGeom prst="diamond">
+                <a:avLst/>
+              </a:prstGeom>
+              <a:noFill/>
+              <a:ln w="28575">
+                <a:solidFill>
+                  <a:schemeClr val="accent1">
+                    <a:lumMod val="60000"/>
+                    <a:lumOff val="40000"/>
+                  </a:schemeClr>
+                </a:solidFill>
+              </a:ln>
+            </p:spPr>
+            <p:style>
+              <a:lnRef idx="2">
+                <a:schemeClr val="accent1">
+                  <a:shade val="50000"/>
+                </a:schemeClr>
+              </a:lnRef>
+              <a:fillRef idx="1">
+                <a:schemeClr val="accent1"/>
+              </a:fillRef>
+              <a:effectRef idx="0">
+                <a:schemeClr val="accent1"/>
+              </a:effectRef>
+              <a:fontRef idx="minor">
+                <a:schemeClr val="lt1"/>
+              </a:fontRef>
+            </p:style>
+            <p:txBody>
+              <a:bodyPr rtlCol="0" anchor="ctr"/>
+              <a:lstStyle/>
+              <a:p>
+                <a:pPr algn="ctr"/>
+                <a:endParaRPr lang="zh-CN" altLang="en-US"/>
+              </a:p>
+            </p:txBody>
+          </p:sp>
+        </p:grpSp>
+      </p:grpSp>
+      <p:sp>
+        <p:nvSpPr>
+          <p:cNvPr id="2" name="灯片编号占位符 1"/>
+          <p:cNvSpPr>
+            <a:spLocks noGrp="1"/>
+          </p:cNvSpPr>
+          <p:nvPr>
+            <p:ph type="sldNum" sz="quarter" idx="10"/>
+          </p:nvPr>
+        </p:nvSpPr>
+        <p:spPr/>
+        <p:txBody>
+          <a:bodyPr/>
+          <a:lstStyle/>
+          <a:p>
+            <a:fld id="{2EC5D418-970F-4C7F-9452-AEC5956F87CE}" type="slidenum">
+              <a:rPr lang="zh-CN" altLang="en-US" smtClean="0"/>
+              <a:pPr/>
+              <a:t>22</a:t>
+            </a:fld>
+            <a:endParaRPr lang="zh-CN" altLang="en-US" dirty="0"/>
+          </a:p>
+        </p:txBody>
+      </p:sp>
+      <p:sp>
+        <p:nvSpPr>
+          <p:cNvPr id="52" name="文本框 51"/>
+          <p:cNvSpPr txBox="1"/>
+          <p:nvPr/>
+        </p:nvSpPr>
+        <p:spPr>
+          <a:xfrm>
+            <a:off x="1874962" y="459176"/>
+            <a:ext cx="4198105" cy="523220"/>
+          </a:xfrm>
+          <a:prstGeom prst="rect">
+            <a:avLst/>
+          </a:prstGeom>
+          <a:noFill/>
+        </p:spPr>
+        <p:txBody>
+          <a:bodyPr wrap="square" rtlCol="0">
+            <a:spAutoFit/>
+            <a:scene3d>
+              <a:camera prst="orthographicFront"/>
+              <a:lightRig rig="threePt" dir="t"/>
+            </a:scene3d>
+            <a:sp3d contourW="12700"/>
+          </a:bodyPr>
+          <a:lstStyle/>
+          <a:p>
+            <a:r>
+              <a:rPr lang="zh-CN" altLang="en-US" sz="2800" b="1" dirty="0" smtClean="0">
+                <a:solidFill>
+                  <a:schemeClr val="tx1">
+                    <a:lumMod val="75000"/>
+                    <a:lumOff val="25000"/>
+                  </a:schemeClr>
+                </a:solidFill>
+                <a:latin typeface="Century Gothic" panose="020B0502020202020204" pitchFamily="34" charset="0"/>
+              </a:rPr>
+              <a:t>系统实现</a:t>
+            </a:r>
+            <a:endParaRPr lang="en-US" altLang="zh-CN" sz="2800" b="1" dirty="0" smtClean="0">
+              <a:solidFill>
+                <a:schemeClr val="tx1">
+                  <a:lumMod val="75000"/>
+                  <a:lumOff val="25000"/>
+                </a:schemeClr>
+              </a:solidFill>
+              <a:latin typeface="Century Gothic" panose="020B0502020202020204" pitchFamily="34" charset="0"/>
+            </a:endParaRPr>
+          </a:p>
+        </p:txBody>
+      </p:sp>
+      <p:sp>
+        <p:nvSpPr>
+          <p:cNvPr id="13" name="文本框 51"/>
+          <p:cNvSpPr txBox="1"/>
+          <p:nvPr/>
+        </p:nvSpPr>
+        <p:spPr>
+          <a:xfrm>
+            <a:off x="1977266" y="1013174"/>
+            <a:ext cx="4198105" cy="461665"/>
+          </a:xfrm>
+          <a:prstGeom prst="rect">
+            <a:avLst/>
+          </a:prstGeom>
+          <a:noFill/>
+        </p:spPr>
+        <p:txBody>
+          <a:bodyPr wrap="square" rtlCol="0">
+            <a:spAutoFit/>
+            <a:scene3d>
+              <a:camera prst="orthographicFront"/>
+              <a:lightRig rig="threePt" dir="t"/>
+            </a:scene3d>
+            <a:sp3d contourW="12700"/>
+          </a:bodyPr>
+          <a:lstStyle/>
+          <a:p>
+            <a:r>
+              <a:rPr lang="en-US" altLang="zh-CN" sz="2400" b="1" dirty="0">
+                <a:solidFill>
+                  <a:schemeClr val="tx1">
+                    <a:lumMod val="75000"/>
+                    <a:lumOff val="25000"/>
+                  </a:schemeClr>
+                </a:solidFill>
+                <a:latin typeface="Century Gothic" panose="020B0502020202020204" pitchFamily="34" charset="0"/>
+              </a:rPr>
+              <a:t>4.4</a:t>
+            </a:r>
+            <a:r>
+              <a:rPr lang="zh-CN" altLang="en-US" sz="2400" b="1" dirty="0">
+                <a:solidFill>
+                  <a:schemeClr val="tx1">
+                    <a:lumMod val="75000"/>
+                    <a:lumOff val="25000"/>
+                  </a:schemeClr>
+                </a:solidFill>
+                <a:latin typeface="Century Gothic" panose="020B0502020202020204" pitchFamily="34" charset="0"/>
+              </a:rPr>
+              <a:t> 运行效果</a:t>
+            </a:r>
+            <a:endParaRPr lang="en-US" altLang="zh-CN" sz="2400" b="1" dirty="0">
+              <a:solidFill>
+                <a:schemeClr val="tx1">
+                  <a:lumMod val="75000"/>
+                  <a:lumOff val="25000"/>
+                </a:schemeClr>
+              </a:solidFill>
+              <a:latin typeface="Century Gothic" panose="020B0502020202020204" pitchFamily="34" charset="0"/>
+            </a:endParaRPr>
+          </a:p>
+        </p:txBody>
+      </p:sp>
+      <p:sp>
+        <p:nvSpPr>
+          <p:cNvPr id="17" name="文本框 51"/>
+          <p:cNvSpPr txBox="1"/>
+          <p:nvPr/>
+        </p:nvSpPr>
+        <p:spPr>
+          <a:xfrm>
+            <a:off x="2428707" y="1505617"/>
+            <a:ext cx="4198105" cy="400110"/>
+          </a:xfrm>
+          <a:prstGeom prst="rect">
+            <a:avLst/>
+          </a:prstGeom>
+          <a:noFill/>
+        </p:spPr>
+        <p:txBody>
+          <a:bodyPr wrap="square" rtlCol="0">
+            <a:spAutoFit/>
+            <a:scene3d>
+              <a:camera prst="orthographicFront"/>
+              <a:lightRig rig="threePt" dir="t"/>
+            </a:scene3d>
+            <a:sp3d contourW="12700"/>
+          </a:bodyPr>
+          <a:lstStyle/>
+          <a:p>
+            <a:r>
+              <a:rPr lang="en-US" altLang="zh-CN" sz="2000" b="1" dirty="0" smtClean="0">
+                <a:solidFill>
+                  <a:schemeClr val="tx1">
+                    <a:lumMod val="75000"/>
+                    <a:lumOff val="25000"/>
+                  </a:schemeClr>
+                </a:solidFill>
+                <a:latin typeface="Century Gothic" panose="020B0502020202020204" pitchFamily="34" charset="0"/>
+              </a:rPr>
+              <a:t>4.4.2</a:t>
+            </a:r>
+            <a:r>
+              <a:rPr lang="zh-CN" altLang="en-US" sz="2000" b="1" dirty="0" smtClean="0">
+                <a:solidFill>
+                  <a:schemeClr val="tx1">
+                    <a:lumMod val="75000"/>
+                    <a:lumOff val="25000"/>
+                  </a:schemeClr>
+                </a:solidFill>
+                <a:latin typeface="Century Gothic" panose="020B0502020202020204" pitchFamily="34" charset="0"/>
+              </a:rPr>
+              <a:t> 游戏开始</a:t>
+            </a:r>
+            <a:endParaRPr lang="en-US" altLang="zh-CN" sz="2000" b="1" dirty="0" smtClean="0">
+              <a:solidFill>
+                <a:schemeClr val="tx1">
+                  <a:lumMod val="75000"/>
+                  <a:lumOff val="25000"/>
+                </a:schemeClr>
+              </a:solidFill>
+              <a:latin typeface="Century Gothic" panose="020B0502020202020204" pitchFamily="34" charset="0"/>
+            </a:endParaRPr>
+          </a:p>
+        </p:txBody>
+      </p:sp>
+      <p:sp>
+        <p:nvSpPr>
+          <p:cNvPr id="19" name="文本框 51"/>
+          <p:cNvSpPr txBox="1"/>
+          <p:nvPr/>
+        </p:nvSpPr>
+        <p:spPr>
+          <a:xfrm>
+            <a:off x="658969" y="2396449"/>
+            <a:ext cx="3824131" cy="923330"/>
+          </a:xfrm>
+          <a:prstGeom prst="rect">
+            <a:avLst/>
+          </a:prstGeom>
+          <a:noFill/>
+        </p:spPr>
+        <p:txBody>
+          <a:bodyPr wrap="square" rtlCol="0">
+            <a:spAutoFit/>
+            <a:scene3d>
+              <a:camera prst="orthographicFront"/>
+              <a:lightRig rig="threePt" dir="t"/>
+            </a:scene3d>
+            <a:sp3d contourW="12700"/>
+          </a:bodyPr>
+          <a:lstStyle/>
+          <a:p>
+            <a:r>
+              <a:rPr lang="zh-CN" altLang="en-US" dirty="0" smtClean="0">
+                <a:solidFill>
+                  <a:schemeClr val="tx1">
+                    <a:lumMod val="75000"/>
+                    <a:lumOff val="25000"/>
+                  </a:schemeClr>
+                </a:solidFill>
+                <a:latin typeface="Century Gothic" panose="020B0502020202020204" pitchFamily="34" charset="0"/>
+              </a:rPr>
+              <a:t>当生命值为</a:t>
+            </a:r>
+            <a:r>
+              <a:rPr lang="en-US" altLang="zh-CN" dirty="0" smtClean="0">
+                <a:solidFill>
+                  <a:schemeClr val="tx1">
+                    <a:lumMod val="75000"/>
+                    <a:lumOff val="25000"/>
+                  </a:schemeClr>
+                </a:solidFill>
+                <a:latin typeface="Century Gothic" panose="020B0502020202020204" pitchFamily="34" charset="0"/>
+              </a:rPr>
+              <a:t>0</a:t>
+            </a:r>
+            <a:r>
+              <a:rPr lang="zh-CN" altLang="en-US" dirty="0" smtClean="0">
+                <a:solidFill>
+                  <a:schemeClr val="tx1">
+                    <a:lumMod val="75000"/>
+                    <a:lumOff val="25000"/>
+                  </a:schemeClr>
+                </a:solidFill>
+                <a:latin typeface="Century Gothic" panose="020B0502020202020204" pitchFamily="34" charset="0"/>
+              </a:rPr>
+              <a:t>时，游戏结束，进入失败页面，显示分数。</a:t>
+            </a:r>
+            <a:endParaRPr lang="en-US" altLang="zh-CN" dirty="0" smtClean="0">
+              <a:solidFill>
+                <a:schemeClr val="tx1">
+                  <a:lumMod val="75000"/>
+                  <a:lumOff val="25000"/>
+                </a:schemeClr>
+              </a:solidFill>
+              <a:latin typeface="Century Gothic" panose="020B0502020202020204" pitchFamily="34" charset="0"/>
+            </a:endParaRPr>
+          </a:p>
+          <a:p>
+            <a:r>
+              <a:rPr lang="zh-CN" altLang="en-US" dirty="0" smtClean="0">
+                <a:solidFill>
+                  <a:schemeClr val="tx1">
+                    <a:lumMod val="75000"/>
+                    <a:lumOff val="25000"/>
+                  </a:schemeClr>
+                </a:solidFill>
+                <a:latin typeface="Century Gothic" panose="020B0502020202020204" pitchFamily="34" charset="0"/>
+              </a:rPr>
+              <a:t>点击开始可以重新开始游戏</a:t>
+            </a:r>
+            <a:endParaRPr lang="en-US" altLang="zh-CN" dirty="0" smtClean="0">
+              <a:solidFill>
+                <a:schemeClr val="tx1">
+                  <a:lumMod val="75000"/>
+                  <a:lumOff val="25000"/>
+                </a:schemeClr>
+              </a:solidFill>
+              <a:latin typeface="Century Gothic" panose="020B0502020202020204" pitchFamily="34" charset="0"/>
+            </a:endParaRPr>
+          </a:p>
+        </p:txBody>
+      </p:sp>
+      <p:pic>
+        <p:nvPicPr>
+          <p:cNvPr id="4" name="Picture 3"/>
+          <p:cNvPicPr>
+            <a:picLocks noChangeAspect="1"/>
+          </p:cNvPicPr>
+          <p:nvPr/>
+        </p:nvPicPr>
+        <p:blipFill>
+          <a:blip r:embed="rId3"/>
+          <a:stretch>
+            <a:fillRect/>
+          </a:stretch>
+        </p:blipFill>
+        <p:spPr>
+          <a:xfrm>
+            <a:off x="4756741" y="1183303"/>
+            <a:ext cx="5560889" cy="4837973"/>
+          </a:xfrm>
+          <a:prstGeom prst="rect">
+            <a:avLst/>
+          </a:prstGeom>
+        </p:spPr>
+      </p:pic>
+    </p:spTree>
+    <p:extLst>
+      <p:ext uri="{BB962C8B-B14F-4D97-AF65-F5344CB8AC3E}">
+        <p14:creationId xmlns:p14="http://schemas.microsoft.com/office/powerpoint/2010/main" val="1016255822"/>
+      </p:ext>
+    </p:extLst>
+  </p:cSld>
+  <p:clrMapOvr>
+    <a:masterClrMapping/>
+  </p:clrMapOvr>
+  <mc:AlternateContent xmlns:mc="http://schemas.openxmlformats.org/markup-compatibility/2006" xmlns:p14="http://schemas.microsoft.com/office/powerpoint/2010/main">
+    <mc:Choice Requires="p14">
+      <p:transition spd="slow" p14:dur="1500">
+        <p:random/>
+      </p:transition>
+    </mc:Choice>
+    <mc:Fallback xmlns="">
+      <p:transition spd="slow">
+        <p:random/>
+      </p:transition>
+    </mc:Fallback>
+  </mc:AlternateContent>
+  <p:timing>
+    <p:tnLst>
+      <p:par>
+        <p:cTn id="1" dur="indefinite" restart="never" nodeType="tmRoot"/>
+      </p:par>
+    </p:tnLst>
+  </p:timing>
+</p:sld>
+</file>
+
+<file path=ppt/slides/slide23.xml><?xml version="1.0" encoding="utf-8"?>
+<p:sld xmlns:a="http://schemas.openxmlformats.org/drawingml/2006/main" xmlns:r="http://schemas.openxmlformats.org/officeDocument/2006/relationships" xmlns:p="http://schemas.openxmlformats.org/presentationml/2006/main">
+  <p:cSld>
+    <p:spTree>
+      <p:nvGrpSpPr>
+        <p:cNvPr id="1" name=""/>
+        <p:cNvGrpSpPr/>
+        <p:nvPr/>
+      </p:nvGrpSpPr>
+      <p:grpSpPr>
+        <a:xfrm>
+          <a:off x="0" y="0"/>
+          <a:ext cx="0" cy="0"/>
+          <a:chOff x="0" y="0"/>
+          <a:chExt cx="0" cy="0"/>
+        </a:xfrm>
+      </p:grpSpPr>
+      <p:grpSp>
+        <p:nvGrpSpPr>
+          <p:cNvPr id="182" name="组合 181"/>
+          <p:cNvGrpSpPr/>
+          <p:nvPr/>
+        </p:nvGrpSpPr>
+        <p:grpSpPr>
+          <a:xfrm>
+            <a:off x="387125" y="299356"/>
+            <a:ext cx="12126303" cy="6596744"/>
+            <a:chOff x="387125" y="299356"/>
+            <a:chExt cx="12126303" cy="6596744"/>
+          </a:xfrm>
+        </p:grpSpPr>
+        <p:grpSp>
+          <p:nvGrpSpPr>
+            <p:cNvPr id="183" name="组合 182"/>
+            <p:cNvGrpSpPr/>
+            <p:nvPr/>
+          </p:nvGrpSpPr>
+          <p:grpSpPr>
+            <a:xfrm>
+              <a:off x="387125" y="299356"/>
+              <a:ext cx="1316500" cy="883947"/>
+              <a:chOff x="1276124" y="1279752"/>
+              <a:chExt cx="6401933" cy="4298496"/>
+            </a:xfrm>
+          </p:grpSpPr>
+          <p:sp>
+            <p:nvSpPr>
+              <p:cNvPr id="191" name="菱形 190"/>
+              <p:cNvSpPr/>
+              <p:nvPr/>
+            </p:nvSpPr>
+            <p:spPr>
+              <a:xfrm>
+                <a:off x="1276124" y="2107066"/>
+                <a:ext cx="2643868" cy="2643868"/>
+              </a:xfrm>
+              <a:prstGeom prst="diamond">
+                <a:avLst/>
+              </a:prstGeom>
+              <a:noFill/>
+              <a:ln w="28575">
+                <a:solidFill>
+                  <a:schemeClr val="accent1">
+                    <a:lumMod val="60000"/>
+                    <a:lumOff val="40000"/>
+                  </a:schemeClr>
+                </a:solidFill>
+              </a:ln>
+            </p:spPr>
+            <p:style>
+              <a:lnRef idx="2">
+                <a:schemeClr val="accent1">
+                  <a:shade val="50000"/>
+                </a:schemeClr>
+              </a:lnRef>
+              <a:fillRef idx="1">
+                <a:schemeClr val="accent1"/>
+              </a:fillRef>
+              <a:effectRef idx="0">
+                <a:schemeClr val="accent1"/>
+              </a:effectRef>
+              <a:fontRef idx="minor">
+                <a:schemeClr val="lt1"/>
+              </a:fontRef>
+            </p:style>
+            <p:txBody>
+              <a:bodyPr rtlCol="0" anchor="ctr"/>
+              <a:lstStyle/>
+              <a:p>
+                <a:pPr algn="ctr"/>
+                <a:endParaRPr lang="zh-CN" altLang="en-US"/>
+              </a:p>
+            </p:txBody>
+          </p:sp>
+          <p:sp>
+            <p:nvSpPr>
+              <p:cNvPr id="192" name="菱形 191"/>
+              <p:cNvSpPr/>
+              <p:nvPr/>
+            </p:nvSpPr>
+            <p:spPr>
+              <a:xfrm>
+                <a:off x="3379561" y="1279752"/>
+                <a:ext cx="4298496" cy="4298496"/>
+              </a:xfrm>
+              <a:prstGeom prst="diamond">
+                <a:avLst/>
+              </a:prstGeom>
+              <a:noFill/>
+              <a:ln w="28575">
+                <a:solidFill>
+                  <a:srgbClr val="A72020"/>
+                </a:solidFill>
+              </a:ln>
+            </p:spPr>
+            <p:style>
+              <a:lnRef idx="2">
+                <a:schemeClr val="accent1">
+                  <a:shade val="50000"/>
+                </a:schemeClr>
+              </a:lnRef>
+              <a:fillRef idx="1">
+                <a:schemeClr val="accent1"/>
+              </a:fillRef>
+              <a:effectRef idx="0">
+                <a:schemeClr val="accent1"/>
+              </a:effectRef>
+              <a:fontRef idx="minor">
+                <a:schemeClr val="lt1"/>
+              </a:fontRef>
+            </p:style>
+            <p:txBody>
+              <a:bodyPr rtlCol="0" anchor="ctr"/>
+              <a:lstStyle/>
+              <a:p>
+                <a:pPr algn="ctr"/>
+                <a:endParaRPr lang="zh-CN" altLang="en-US"/>
+              </a:p>
+            </p:txBody>
+          </p:sp>
+        </p:grpSp>
+        <p:sp>
+          <p:nvSpPr>
+            <p:cNvPr id="184" name="文本框 183"/>
+            <p:cNvSpPr txBox="1"/>
+            <p:nvPr/>
+          </p:nvSpPr>
+          <p:spPr>
+            <a:xfrm>
+              <a:off x="900242" y="428399"/>
+              <a:ext cx="722818" cy="584775"/>
+            </a:xfrm>
+            <a:prstGeom prst="rect">
+              <a:avLst/>
+            </a:prstGeom>
+            <a:noFill/>
+          </p:spPr>
+          <p:txBody>
+            <a:bodyPr wrap="square" rtlCol="0">
+              <a:spAutoFit/>
+              <a:scene3d>
+                <a:camera prst="orthographicFront"/>
+                <a:lightRig rig="threePt" dir="t"/>
+              </a:scene3d>
+              <a:sp3d contourW="12700"/>
+            </a:bodyPr>
+            <a:lstStyle/>
+            <a:p>
+              <a:pPr algn="ctr"/>
+              <a:r>
+                <a:rPr lang="en-US" altLang="zh-CN" sz="3200" dirty="0" smtClean="0">
+                  <a:solidFill>
+                    <a:schemeClr val="accent1"/>
+                  </a:solidFill>
+                  <a:latin typeface="Agency FB" panose="020B0503020202020204" pitchFamily="34" charset="0"/>
+                </a:rPr>
+                <a:t>04</a:t>
+              </a:r>
+              <a:endParaRPr lang="zh-CN" altLang="en-US" sz="3200" dirty="0">
+                <a:solidFill>
+                  <a:schemeClr val="accent1"/>
+                </a:solidFill>
+                <a:latin typeface="Agency FB" panose="020B0503020202020204" pitchFamily="34" charset="0"/>
+              </a:endParaRPr>
+            </a:p>
+          </p:txBody>
+        </p:sp>
+        <p:grpSp>
+          <p:nvGrpSpPr>
+            <p:cNvPr id="186" name="组合 185"/>
+            <p:cNvGrpSpPr/>
+            <p:nvPr/>
+          </p:nvGrpSpPr>
+          <p:grpSpPr>
+            <a:xfrm>
+              <a:off x="11572872" y="6254988"/>
+              <a:ext cx="940556" cy="641112"/>
+              <a:chOff x="11395287" y="6034159"/>
+              <a:chExt cx="1208633" cy="823841"/>
+            </a:xfrm>
+          </p:grpSpPr>
+          <p:sp>
+            <p:nvSpPr>
+              <p:cNvPr id="187" name="菱形 186"/>
+              <p:cNvSpPr/>
+              <p:nvPr/>
+            </p:nvSpPr>
+            <p:spPr>
+              <a:xfrm>
+                <a:off x="11780079" y="6034159"/>
+                <a:ext cx="823841" cy="823841"/>
+              </a:xfrm>
+              <a:prstGeom prst="diamond">
+                <a:avLst/>
+              </a:prstGeom>
+              <a:noFill/>
+              <a:ln w="28575">
+                <a:solidFill>
+                  <a:schemeClr val="accent1">
+                    <a:lumMod val="60000"/>
+                    <a:lumOff val="40000"/>
+                  </a:schemeClr>
+                </a:solidFill>
+              </a:ln>
+            </p:spPr>
+            <p:style>
+              <a:lnRef idx="2">
+                <a:schemeClr val="accent1">
+                  <a:shade val="50000"/>
+                </a:schemeClr>
+              </a:lnRef>
+              <a:fillRef idx="1">
+                <a:schemeClr val="accent1"/>
+              </a:fillRef>
+              <a:effectRef idx="0">
+                <a:schemeClr val="accent1"/>
+              </a:effectRef>
+              <a:fontRef idx="minor">
+                <a:schemeClr val="lt1"/>
+              </a:fontRef>
+            </p:style>
+            <p:txBody>
+              <a:bodyPr rtlCol="0" anchor="ctr"/>
+              <a:lstStyle/>
+              <a:p>
+                <a:pPr algn="ctr"/>
+                <a:endParaRPr lang="zh-CN" altLang="en-US"/>
+              </a:p>
+            </p:txBody>
+          </p:sp>
+          <p:sp>
+            <p:nvSpPr>
+              <p:cNvPr id="188" name="菱形 187"/>
+              <p:cNvSpPr/>
+              <p:nvPr/>
+            </p:nvSpPr>
+            <p:spPr>
+              <a:xfrm>
+                <a:off x="11395287" y="6157367"/>
+                <a:ext cx="577426" cy="577426"/>
+              </a:xfrm>
+              <a:prstGeom prst="diamond">
+                <a:avLst/>
+              </a:prstGeom>
+              <a:noFill/>
+              <a:ln w="28575">
+                <a:solidFill>
+                  <a:schemeClr val="accent1">
+                    <a:lumMod val="60000"/>
+                    <a:lumOff val="40000"/>
+                  </a:schemeClr>
+                </a:solidFill>
+              </a:ln>
+            </p:spPr>
+            <p:style>
+              <a:lnRef idx="2">
+                <a:schemeClr val="accent1">
+                  <a:shade val="50000"/>
+                </a:schemeClr>
+              </a:lnRef>
+              <a:fillRef idx="1">
+                <a:schemeClr val="accent1"/>
+              </a:fillRef>
+              <a:effectRef idx="0">
+                <a:schemeClr val="accent1"/>
+              </a:effectRef>
+              <a:fontRef idx="minor">
+                <a:schemeClr val="lt1"/>
+              </a:fontRef>
+            </p:style>
+            <p:txBody>
+              <a:bodyPr rtlCol="0" anchor="ctr"/>
+              <a:lstStyle/>
+              <a:p>
+                <a:pPr algn="ctr"/>
+                <a:endParaRPr lang="zh-CN" altLang="en-US"/>
+              </a:p>
+            </p:txBody>
+          </p:sp>
+        </p:grpSp>
+      </p:grpSp>
+      <p:sp>
+        <p:nvSpPr>
+          <p:cNvPr id="2" name="灯片编号占位符 1"/>
+          <p:cNvSpPr>
+            <a:spLocks noGrp="1"/>
+          </p:cNvSpPr>
+          <p:nvPr>
+            <p:ph type="sldNum" sz="quarter" idx="10"/>
+          </p:nvPr>
+        </p:nvSpPr>
+        <p:spPr/>
+        <p:txBody>
+          <a:bodyPr/>
+          <a:lstStyle/>
+          <a:p>
+            <a:fld id="{2EC5D418-970F-4C7F-9452-AEC5956F87CE}" type="slidenum">
+              <a:rPr lang="zh-CN" altLang="en-US" smtClean="0"/>
+              <a:pPr/>
+              <a:t>23</a:t>
+            </a:fld>
+            <a:endParaRPr lang="zh-CN" altLang="en-US" dirty="0"/>
+          </a:p>
+        </p:txBody>
+      </p:sp>
+      <p:sp>
+        <p:nvSpPr>
+          <p:cNvPr id="52" name="文本框 51"/>
+          <p:cNvSpPr txBox="1"/>
+          <p:nvPr/>
+        </p:nvSpPr>
+        <p:spPr>
+          <a:xfrm>
+            <a:off x="1874962" y="459176"/>
+            <a:ext cx="4198105" cy="523220"/>
+          </a:xfrm>
+          <a:prstGeom prst="rect">
+            <a:avLst/>
+          </a:prstGeom>
+          <a:noFill/>
+        </p:spPr>
+        <p:txBody>
+          <a:bodyPr wrap="square" rtlCol="0">
+            <a:spAutoFit/>
+            <a:scene3d>
+              <a:camera prst="orthographicFront"/>
+              <a:lightRig rig="threePt" dir="t"/>
+            </a:scene3d>
+            <a:sp3d contourW="12700"/>
+          </a:bodyPr>
+          <a:lstStyle/>
+          <a:p>
+            <a:r>
+              <a:rPr lang="zh-CN" altLang="en-US" sz="2800" b="1" dirty="0" smtClean="0">
+                <a:solidFill>
+                  <a:schemeClr val="tx1">
+                    <a:lumMod val="75000"/>
+                    <a:lumOff val="25000"/>
+                  </a:schemeClr>
+                </a:solidFill>
+                <a:latin typeface="Century Gothic" panose="020B0502020202020204" pitchFamily="34" charset="0"/>
+              </a:rPr>
+              <a:t>系统实现</a:t>
+            </a:r>
+            <a:endParaRPr lang="en-US" altLang="zh-CN" sz="2800" b="1" dirty="0" smtClean="0">
+              <a:solidFill>
+                <a:schemeClr val="tx1">
+                  <a:lumMod val="75000"/>
+                  <a:lumOff val="25000"/>
+                </a:schemeClr>
+              </a:solidFill>
+              <a:latin typeface="Century Gothic" panose="020B0502020202020204" pitchFamily="34" charset="0"/>
+            </a:endParaRPr>
+          </a:p>
+        </p:txBody>
+      </p:sp>
+      <p:sp>
+        <p:nvSpPr>
+          <p:cNvPr id="13" name="文本框 51"/>
+          <p:cNvSpPr txBox="1"/>
+          <p:nvPr/>
+        </p:nvSpPr>
+        <p:spPr>
+          <a:xfrm>
+            <a:off x="1977266" y="1013174"/>
+            <a:ext cx="4198105" cy="461665"/>
+          </a:xfrm>
+          <a:prstGeom prst="rect">
+            <a:avLst/>
+          </a:prstGeom>
+          <a:noFill/>
+        </p:spPr>
+        <p:txBody>
+          <a:bodyPr wrap="square" rtlCol="0">
+            <a:spAutoFit/>
+            <a:scene3d>
+              <a:camera prst="orthographicFront"/>
+              <a:lightRig rig="threePt" dir="t"/>
+            </a:scene3d>
+            <a:sp3d contourW="12700"/>
+          </a:bodyPr>
+          <a:lstStyle/>
+          <a:p>
+            <a:r>
+              <a:rPr lang="en-US" altLang="zh-CN" sz="2400" b="1" dirty="0">
+                <a:solidFill>
+                  <a:schemeClr val="tx1">
+                    <a:lumMod val="75000"/>
+                    <a:lumOff val="25000"/>
+                  </a:schemeClr>
+                </a:solidFill>
+                <a:latin typeface="Century Gothic" panose="020B0502020202020204" pitchFamily="34" charset="0"/>
+              </a:rPr>
+              <a:t>4.4</a:t>
+            </a:r>
+            <a:r>
+              <a:rPr lang="zh-CN" altLang="en-US" sz="2400" b="1" dirty="0">
+                <a:solidFill>
+                  <a:schemeClr val="tx1">
+                    <a:lumMod val="75000"/>
+                    <a:lumOff val="25000"/>
+                  </a:schemeClr>
+                </a:solidFill>
+                <a:latin typeface="Century Gothic" panose="020B0502020202020204" pitchFamily="34" charset="0"/>
+              </a:rPr>
+              <a:t> 运行效果</a:t>
+            </a:r>
+            <a:endParaRPr lang="en-US" altLang="zh-CN" sz="2400" b="1" dirty="0">
+              <a:solidFill>
+                <a:schemeClr val="tx1">
+                  <a:lumMod val="75000"/>
+                  <a:lumOff val="25000"/>
+                </a:schemeClr>
+              </a:solidFill>
+              <a:latin typeface="Century Gothic" panose="020B0502020202020204" pitchFamily="34" charset="0"/>
+            </a:endParaRPr>
+          </a:p>
+        </p:txBody>
+      </p:sp>
+      <p:sp>
+        <p:nvSpPr>
+          <p:cNvPr id="17" name="文本框 51"/>
+          <p:cNvSpPr txBox="1"/>
+          <p:nvPr/>
+        </p:nvSpPr>
+        <p:spPr>
+          <a:xfrm>
+            <a:off x="2428707" y="1505617"/>
+            <a:ext cx="4198105" cy="400110"/>
+          </a:xfrm>
+          <a:prstGeom prst="rect">
+            <a:avLst/>
+          </a:prstGeom>
+          <a:noFill/>
+        </p:spPr>
+        <p:txBody>
+          <a:bodyPr wrap="square" rtlCol="0">
+            <a:spAutoFit/>
+            <a:scene3d>
+              <a:camera prst="orthographicFront"/>
+              <a:lightRig rig="threePt" dir="t"/>
+            </a:scene3d>
+            <a:sp3d contourW="12700"/>
+          </a:bodyPr>
+          <a:lstStyle/>
+          <a:p>
+            <a:r>
+              <a:rPr lang="en-US" altLang="zh-CN" sz="2000" b="1" dirty="0" smtClean="0">
+                <a:solidFill>
+                  <a:schemeClr val="tx1">
+                    <a:lumMod val="75000"/>
+                    <a:lumOff val="25000"/>
+                  </a:schemeClr>
+                </a:solidFill>
+                <a:latin typeface="Century Gothic" panose="020B0502020202020204" pitchFamily="34" charset="0"/>
+              </a:rPr>
+              <a:t>4.4.2</a:t>
+            </a:r>
+            <a:r>
+              <a:rPr lang="zh-CN" altLang="en-US" sz="2000" b="1" dirty="0" smtClean="0">
+                <a:solidFill>
+                  <a:schemeClr val="tx1">
+                    <a:lumMod val="75000"/>
+                    <a:lumOff val="25000"/>
+                  </a:schemeClr>
+                </a:solidFill>
+                <a:latin typeface="Century Gothic" panose="020B0502020202020204" pitchFamily="34" charset="0"/>
+              </a:rPr>
+              <a:t> 游戏开始</a:t>
+            </a:r>
+            <a:endParaRPr lang="en-US" altLang="zh-CN" sz="2000" b="1" dirty="0" smtClean="0">
+              <a:solidFill>
+                <a:schemeClr val="tx1">
+                  <a:lumMod val="75000"/>
+                  <a:lumOff val="25000"/>
+                </a:schemeClr>
+              </a:solidFill>
+              <a:latin typeface="Century Gothic" panose="020B0502020202020204" pitchFamily="34" charset="0"/>
+            </a:endParaRPr>
+          </a:p>
+        </p:txBody>
+      </p:sp>
+      <p:sp>
+        <p:nvSpPr>
+          <p:cNvPr id="19" name="文本框 51"/>
+          <p:cNvSpPr txBox="1"/>
+          <p:nvPr/>
+        </p:nvSpPr>
+        <p:spPr>
+          <a:xfrm>
+            <a:off x="658969" y="2396449"/>
+            <a:ext cx="3824131" cy="923330"/>
+          </a:xfrm>
+          <a:prstGeom prst="rect">
+            <a:avLst/>
+          </a:prstGeom>
+          <a:noFill/>
+        </p:spPr>
+        <p:txBody>
+          <a:bodyPr wrap="square" rtlCol="0">
+            <a:spAutoFit/>
+            <a:scene3d>
+              <a:camera prst="orthographicFront"/>
+              <a:lightRig rig="threePt" dir="t"/>
+            </a:scene3d>
+            <a:sp3d contourW="12700"/>
+          </a:bodyPr>
+          <a:lstStyle/>
+          <a:p>
+            <a:r>
+              <a:rPr lang="zh-CN" altLang="en-US" dirty="0" smtClean="0">
+                <a:solidFill>
+                  <a:schemeClr val="tx1">
+                    <a:lumMod val="75000"/>
+                    <a:lumOff val="25000"/>
+                  </a:schemeClr>
+                </a:solidFill>
+                <a:latin typeface="Century Gothic" panose="020B0502020202020204" pitchFamily="34" charset="0"/>
+              </a:rPr>
+              <a:t>当生命值为</a:t>
+            </a:r>
+            <a:r>
+              <a:rPr lang="en-US" altLang="zh-CN" dirty="0" smtClean="0">
+                <a:solidFill>
+                  <a:schemeClr val="tx1">
+                    <a:lumMod val="75000"/>
+                    <a:lumOff val="25000"/>
+                  </a:schemeClr>
+                </a:solidFill>
+                <a:latin typeface="Century Gothic" panose="020B0502020202020204" pitchFamily="34" charset="0"/>
+              </a:rPr>
+              <a:t>0</a:t>
+            </a:r>
+            <a:r>
+              <a:rPr lang="zh-CN" altLang="en-US" dirty="0" smtClean="0">
+                <a:solidFill>
+                  <a:schemeClr val="tx1">
+                    <a:lumMod val="75000"/>
+                    <a:lumOff val="25000"/>
+                  </a:schemeClr>
+                </a:solidFill>
+                <a:latin typeface="Century Gothic" panose="020B0502020202020204" pitchFamily="34" charset="0"/>
+              </a:rPr>
+              <a:t>时，游戏结束，进入失败页面，显示分数。</a:t>
+            </a:r>
+            <a:endParaRPr lang="en-US" altLang="zh-CN" dirty="0" smtClean="0">
+              <a:solidFill>
+                <a:schemeClr val="tx1">
+                  <a:lumMod val="75000"/>
+                  <a:lumOff val="25000"/>
+                </a:schemeClr>
+              </a:solidFill>
+              <a:latin typeface="Century Gothic" panose="020B0502020202020204" pitchFamily="34" charset="0"/>
+            </a:endParaRPr>
+          </a:p>
+          <a:p>
+            <a:r>
+              <a:rPr lang="zh-CN" altLang="en-US" dirty="0" smtClean="0">
+                <a:solidFill>
+                  <a:schemeClr val="tx1">
+                    <a:lumMod val="75000"/>
+                    <a:lumOff val="25000"/>
+                  </a:schemeClr>
+                </a:solidFill>
+                <a:latin typeface="Century Gothic" panose="020B0502020202020204" pitchFamily="34" charset="0"/>
+              </a:rPr>
+              <a:t>点击开始可以重新开始游戏</a:t>
+            </a:r>
+            <a:endParaRPr lang="en-US" altLang="zh-CN" dirty="0" smtClean="0">
+              <a:solidFill>
+                <a:schemeClr val="tx1">
+                  <a:lumMod val="75000"/>
+                  <a:lumOff val="25000"/>
+                </a:schemeClr>
+              </a:solidFill>
+              <a:latin typeface="Century Gothic" panose="020B0502020202020204" pitchFamily="34" charset="0"/>
+            </a:endParaRPr>
+          </a:p>
+        </p:txBody>
+      </p:sp>
+      <p:pic>
+        <p:nvPicPr>
+          <p:cNvPr id="4" name="Picture 3"/>
+          <p:cNvPicPr>
+            <a:picLocks noChangeAspect="1"/>
+          </p:cNvPicPr>
+          <p:nvPr/>
+        </p:nvPicPr>
+        <p:blipFill>
+          <a:blip r:embed="rId3"/>
+          <a:stretch>
+            <a:fillRect/>
+          </a:stretch>
+        </p:blipFill>
+        <p:spPr>
+          <a:xfrm>
+            <a:off x="4756741" y="1183303"/>
+            <a:ext cx="5560889" cy="4837973"/>
+          </a:xfrm>
+          <a:prstGeom prst="rect">
+            <a:avLst/>
+          </a:prstGeom>
+        </p:spPr>
+      </p:pic>
+    </p:spTree>
+    <p:extLst>
+      <p:ext uri="{BB962C8B-B14F-4D97-AF65-F5344CB8AC3E}">
+        <p14:creationId xmlns:p14="http://schemas.microsoft.com/office/powerpoint/2010/main" val="1145980112"/>
+      </p:ext>
+    </p:extLst>
+  </p:cSld>
+  <p:clrMapOvr>
+    <a:masterClrMapping/>
+  </p:clrMapOvr>
+  <mc:AlternateContent xmlns:mc="http://schemas.openxmlformats.org/markup-compatibility/2006" xmlns:p14="http://schemas.microsoft.com/office/powerpoint/2010/main">
+    <mc:Choice Requires="p14">
+      <p:transition spd="slow" p14:dur="1500">
+        <p:random/>
+      </p:transition>
+    </mc:Choice>
+    <mc:Fallback xmlns="">
+      <p:transition spd="slow">
+        <p:random/>
+      </p:transition>
+    </mc:Fallback>
+  </mc:AlternateContent>
+  <p:timing>
+    <p:tnLst>
+      <p:par>
+        <p:cTn id="1" dur="indefinite" restart="never" nodeType="tmRoot"/>
+      </p:par>
+    </p:tnLst>
+  </p:timing>
+</p:sld>
+</file>
+
+<file path=ppt/slides/slide24.xml><?xml version="1.0" encoding="utf-8"?>
+<p:sld xmlns:a="http://schemas.openxmlformats.org/drawingml/2006/main" xmlns:r="http://schemas.openxmlformats.org/officeDocument/2006/relationships" xmlns:p="http://schemas.openxmlformats.org/presentationml/2006/main">
+  <p:cSld>
+    <p:spTree>
+      <p:nvGrpSpPr>
+        <p:cNvPr id="1" name=""/>
+        <p:cNvGrpSpPr/>
+        <p:nvPr/>
+      </p:nvGrpSpPr>
+      <p:grpSpPr>
+        <a:xfrm>
+          <a:off x="0" y="0"/>
+          <a:ext cx="0" cy="0"/>
+          <a:chOff x="0" y="0"/>
+          <a:chExt cx="0" cy="0"/>
+        </a:xfrm>
+      </p:grpSpPr>
+      <p:grpSp>
+        <p:nvGrpSpPr>
+          <p:cNvPr id="182" name="组合 181"/>
+          <p:cNvGrpSpPr/>
+          <p:nvPr/>
+        </p:nvGrpSpPr>
+        <p:grpSpPr>
+          <a:xfrm>
+            <a:off x="387125" y="299356"/>
+            <a:ext cx="12126303" cy="6596744"/>
+            <a:chOff x="387125" y="299356"/>
+            <a:chExt cx="12126303" cy="6596744"/>
+          </a:xfrm>
+        </p:grpSpPr>
+        <p:grpSp>
+          <p:nvGrpSpPr>
+            <p:cNvPr id="183" name="组合 182"/>
+            <p:cNvGrpSpPr/>
+            <p:nvPr/>
+          </p:nvGrpSpPr>
+          <p:grpSpPr>
+            <a:xfrm>
+              <a:off x="387125" y="299356"/>
+              <a:ext cx="1316500" cy="883947"/>
+              <a:chOff x="1276124" y="1279752"/>
+              <a:chExt cx="6401933" cy="4298496"/>
+            </a:xfrm>
+          </p:grpSpPr>
+          <p:sp>
+            <p:nvSpPr>
+              <p:cNvPr id="191" name="菱形 190"/>
+              <p:cNvSpPr/>
+              <p:nvPr/>
+            </p:nvSpPr>
+            <p:spPr>
+              <a:xfrm>
+                <a:off x="1276124" y="2107066"/>
+                <a:ext cx="2643868" cy="2643868"/>
+              </a:xfrm>
+              <a:prstGeom prst="diamond">
+                <a:avLst/>
+              </a:prstGeom>
+              <a:noFill/>
+              <a:ln w="28575">
+                <a:solidFill>
+                  <a:schemeClr val="accent1">
+                    <a:lumMod val="60000"/>
+                    <a:lumOff val="40000"/>
+                  </a:schemeClr>
+                </a:solidFill>
+              </a:ln>
+            </p:spPr>
+            <p:style>
+              <a:lnRef idx="2">
+                <a:schemeClr val="accent1">
+                  <a:shade val="50000"/>
+                </a:schemeClr>
+              </a:lnRef>
+              <a:fillRef idx="1">
+                <a:schemeClr val="accent1"/>
+              </a:fillRef>
+              <a:effectRef idx="0">
+                <a:schemeClr val="accent1"/>
+              </a:effectRef>
+              <a:fontRef idx="minor">
+                <a:schemeClr val="lt1"/>
+              </a:fontRef>
+            </p:style>
+            <p:txBody>
+              <a:bodyPr rtlCol="0" anchor="ctr"/>
+              <a:lstStyle/>
+              <a:p>
+                <a:pPr algn="ctr"/>
+                <a:endParaRPr lang="zh-CN" altLang="en-US"/>
+              </a:p>
+            </p:txBody>
+          </p:sp>
+          <p:sp>
+            <p:nvSpPr>
+              <p:cNvPr id="192" name="菱形 191"/>
+              <p:cNvSpPr/>
+              <p:nvPr/>
+            </p:nvSpPr>
+            <p:spPr>
+              <a:xfrm>
+                <a:off x="3379561" y="1279752"/>
+                <a:ext cx="4298496" cy="4298496"/>
+              </a:xfrm>
+              <a:prstGeom prst="diamond">
+                <a:avLst/>
+              </a:prstGeom>
+              <a:noFill/>
+              <a:ln w="28575">
+                <a:solidFill>
+                  <a:srgbClr val="A72020"/>
+                </a:solidFill>
+              </a:ln>
+            </p:spPr>
+            <p:style>
+              <a:lnRef idx="2">
+                <a:schemeClr val="accent1">
+                  <a:shade val="50000"/>
+                </a:schemeClr>
+              </a:lnRef>
+              <a:fillRef idx="1">
+                <a:schemeClr val="accent1"/>
+              </a:fillRef>
+              <a:effectRef idx="0">
+                <a:schemeClr val="accent1"/>
+              </a:effectRef>
+              <a:fontRef idx="minor">
+                <a:schemeClr val="lt1"/>
+              </a:fontRef>
+            </p:style>
+            <p:txBody>
+              <a:bodyPr rtlCol="0" anchor="ctr"/>
+              <a:lstStyle/>
+              <a:p>
+                <a:pPr algn="ctr"/>
+                <a:endParaRPr lang="zh-CN" altLang="en-US"/>
+              </a:p>
+            </p:txBody>
+          </p:sp>
+        </p:grpSp>
+        <p:grpSp>
+          <p:nvGrpSpPr>
+            <p:cNvPr id="186" name="组合 185"/>
+            <p:cNvGrpSpPr/>
+            <p:nvPr/>
+          </p:nvGrpSpPr>
+          <p:grpSpPr>
+            <a:xfrm>
+              <a:off x="11572872" y="6254988"/>
+              <a:ext cx="940556" cy="641112"/>
+              <a:chOff x="11395287" y="6034159"/>
+              <a:chExt cx="1208633" cy="823841"/>
+            </a:xfrm>
+          </p:grpSpPr>
+          <p:sp>
+            <p:nvSpPr>
+              <p:cNvPr id="187" name="菱形 186"/>
+              <p:cNvSpPr/>
+              <p:nvPr/>
+            </p:nvSpPr>
+            <p:spPr>
+              <a:xfrm>
+                <a:off x="11780079" y="6034159"/>
+                <a:ext cx="823841" cy="823841"/>
+              </a:xfrm>
+              <a:prstGeom prst="diamond">
+                <a:avLst/>
+              </a:prstGeom>
+              <a:noFill/>
+              <a:ln w="28575">
+                <a:solidFill>
+                  <a:schemeClr val="accent1">
+                    <a:lumMod val="60000"/>
+                    <a:lumOff val="40000"/>
+                  </a:schemeClr>
+                </a:solidFill>
+              </a:ln>
+            </p:spPr>
+            <p:style>
+              <a:lnRef idx="2">
+                <a:schemeClr val="accent1">
+                  <a:shade val="50000"/>
+                </a:schemeClr>
+              </a:lnRef>
+              <a:fillRef idx="1">
+                <a:schemeClr val="accent1"/>
+              </a:fillRef>
+              <a:effectRef idx="0">
+                <a:schemeClr val="accent1"/>
+              </a:effectRef>
+              <a:fontRef idx="minor">
+                <a:schemeClr val="lt1"/>
+              </a:fontRef>
+            </p:style>
+            <p:txBody>
+              <a:bodyPr rtlCol="0" anchor="ctr"/>
+              <a:lstStyle/>
+              <a:p>
+                <a:pPr algn="ctr"/>
+                <a:endParaRPr lang="zh-CN" altLang="en-US"/>
+              </a:p>
+            </p:txBody>
+          </p:sp>
+          <p:sp>
+            <p:nvSpPr>
+              <p:cNvPr id="188" name="菱形 187"/>
+              <p:cNvSpPr/>
+              <p:nvPr/>
+            </p:nvSpPr>
+            <p:spPr>
+              <a:xfrm>
+                <a:off x="11395287" y="6157367"/>
+                <a:ext cx="577426" cy="577426"/>
+              </a:xfrm>
+              <a:prstGeom prst="diamond">
+                <a:avLst/>
+              </a:prstGeom>
+              <a:noFill/>
+              <a:ln w="28575">
+                <a:solidFill>
+                  <a:schemeClr val="accent1">
+                    <a:lumMod val="60000"/>
+                    <a:lumOff val="40000"/>
+                  </a:schemeClr>
+                </a:solidFill>
+              </a:ln>
+            </p:spPr>
+            <p:style>
+              <a:lnRef idx="2">
+                <a:schemeClr val="accent1">
+                  <a:shade val="50000"/>
+                </a:schemeClr>
+              </a:lnRef>
+              <a:fillRef idx="1">
+                <a:schemeClr val="accent1"/>
+              </a:fillRef>
+              <a:effectRef idx="0">
+                <a:schemeClr val="accent1"/>
+              </a:effectRef>
+              <a:fontRef idx="minor">
+                <a:schemeClr val="lt1"/>
+              </a:fontRef>
+            </p:style>
+            <p:txBody>
+              <a:bodyPr rtlCol="0" anchor="ctr"/>
+              <a:lstStyle/>
+              <a:p>
+                <a:pPr algn="ctr"/>
+                <a:endParaRPr lang="zh-CN" altLang="en-US"/>
+              </a:p>
+            </p:txBody>
+          </p:sp>
+        </p:grpSp>
+      </p:grpSp>
+      <p:sp>
+        <p:nvSpPr>
+          <p:cNvPr id="2" name="灯片编号占位符 1"/>
+          <p:cNvSpPr>
+            <a:spLocks noGrp="1"/>
+          </p:cNvSpPr>
+          <p:nvPr>
+            <p:ph type="sldNum" sz="quarter" idx="10"/>
+          </p:nvPr>
+        </p:nvSpPr>
+        <p:spPr/>
+        <p:txBody>
+          <a:bodyPr/>
+          <a:lstStyle/>
+          <a:p>
+            <a:fld id="{2EC5D418-970F-4C7F-9452-AEC5956F87CE}" type="slidenum">
+              <a:rPr lang="zh-CN" altLang="en-US" smtClean="0"/>
+              <a:pPr/>
+              <a:t>24</a:t>
+            </a:fld>
+            <a:endParaRPr lang="zh-CN" altLang="en-US" dirty="0"/>
+          </a:p>
+        </p:txBody>
+      </p:sp>
+      <p:sp>
+        <p:nvSpPr>
           <p:cNvPr id="53" name="文本框 52"/>
           <p:cNvSpPr txBox="1"/>
           <p:nvPr/>
@@ -13730,7 +15930,7 @@
 </p:sld>
 </file>
 
-<file path=ppt/slides/slide22.xml><?xml version="1.0" encoding="utf-8"?>
+<file path=ppt/slides/slide25.xml><?xml version="1.0" encoding="utf-8"?>
 <p:sld xmlns:a="http://schemas.openxmlformats.org/drawingml/2006/main" xmlns:r="http://schemas.openxmlformats.org/officeDocument/2006/relationships" xmlns:p="http://schemas.openxmlformats.org/presentationml/2006/main">
   <p:cSld>
     <p:spTree>

</xml_diff>